<commit_message>
Added powerpoing additional information
</commit_message>
<xml_diff>
--- a/chapter_2/Chapter 2.pptx
+++ b/chapter_2/Chapter 2.pptx
@@ -7,10 +7,10 @@
   <p:sldIdLst>
     <p:sldId id="256" r:id="rId2"/>
     <p:sldId id="257" r:id="rId3"/>
-    <p:sldId id="260" r:id="rId4"/>
-    <p:sldId id="262" r:id="rId5"/>
-    <p:sldId id="263" r:id="rId6"/>
-    <p:sldId id="264" r:id="rId7"/>
+    <p:sldId id="262" r:id="rId4"/>
+    <p:sldId id="263" r:id="rId5"/>
+    <p:sldId id="264" r:id="rId6"/>
+    <p:sldId id="260" r:id="rId7"/>
     <p:sldId id="259" r:id="rId8"/>
     <p:sldId id="261" r:id="rId9"/>
     <p:sldId id="265" r:id="rId10"/>
@@ -182,7 +182,7 @@
           <a:noFill/>
           <a:extLst>
             <a:ext uri="{909E8E84-426E-40dd-AFC4-6F175D3DCCD1}">
-              <a14:hiddenFill xmlns="" xmlns:a14="http://schemas.microsoft.com/office/drawing/2010/main">
+              <a14:hiddenFill xmlns:a14="http://schemas.microsoft.com/office/drawing/2010/main" xmlns="">
                 <a:solidFill>
                   <a:srgbClr val="FFFFFF"/>
                 </a:solidFill>
@@ -242,7 +242,7 @@
             </a:ln>
             <a:extLst>
               <a:ext uri="{91240B29-F687-4f45-9708-019B960494DF}">
-                <a14:hiddenLine xmlns="" xmlns:a14="http://schemas.microsoft.com/office/drawing/2010/main" w="9525">
+                <a14:hiddenLine xmlns:a14="http://schemas.microsoft.com/office/drawing/2010/main" xmlns="" w="9525">
                   <a:solidFill>
                     <a:srgbClr val="000000"/>
                   </a:solidFill>
@@ -332,7 +332,7 @@
             </a:ln>
             <a:extLst>
               <a:ext uri="{91240B29-F687-4f45-9708-019B960494DF}">
-                <a14:hiddenLine xmlns="" xmlns:a14="http://schemas.microsoft.com/office/drawing/2010/main" w="9525">
+                <a14:hiddenLine xmlns:a14="http://schemas.microsoft.com/office/drawing/2010/main" xmlns="" w="9525">
                   <a:solidFill>
                     <a:srgbClr val="000000"/>
                   </a:solidFill>
@@ -422,7 +422,7 @@
             </a:ln>
             <a:extLst>
               <a:ext uri="{91240B29-F687-4f45-9708-019B960494DF}">
-                <a14:hiddenLine xmlns="" xmlns:a14="http://schemas.microsoft.com/office/drawing/2010/main" w="9525">
+                <a14:hiddenLine xmlns:a14="http://schemas.microsoft.com/office/drawing/2010/main" xmlns="" w="9525">
                   <a:solidFill>
                     <a:srgbClr val="000000"/>
                   </a:solidFill>
@@ -456,7 +456,7 @@
             </a:ln>
             <a:extLst>
               <a:ext uri="{91240B29-F687-4f45-9708-019B960494DF}">
-                <a14:hiddenLine xmlns="" xmlns:a14="http://schemas.microsoft.com/office/drawing/2010/main" w="9525">
+                <a14:hiddenLine xmlns:a14="http://schemas.microsoft.com/office/drawing/2010/main" xmlns="" w="9525">
                   <a:solidFill>
                     <a:srgbClr val="000000"/>
                   </a:solidFill>
@@ -546,7 +546,7 @@
             </a:ln>
             <a:extLst>
               <a:ext uri="{91240B29-F687-4f45-9708-019B960494DF}">
-                <a14:hiddenLine xmlns="" xmlns:a14="http://schemas.microsoft.com/office/drawing/2010/main" w="9525">
+                <a14:hiddenLine xmlns:a14="http://schemas.microsoft.com/office/drawing/2010/main" xmlns="" w="9525">
                   <a:solidFill>
                     <a:srgbClr val="000000"/>
                   </a:solidFill>
@@ -608,7 +608,7 @@
             </a:ln>
             <a:extLst>
               <a:ext uri="{91240B29-F687-4f45-9708-019B960494DF}">
-                <a14:hiddenLine xmlns="" xmlns:a14="http://schemas.microsoft.com/office/drawing/2010/main" w="9525">
+                <a14:hiddenLine xmlns:a14="http://schemas.microsoft.com/office/drawing/2010/main" xmlns="" w="9525">
                   <a:solidFill>
                     <a:srgbClr val="000000"/>
                   </a:solidFill>
@@ -670,7 +670,7 @@
             </a:ln>
             <a:extLst>
               <a:ext uri="{91240B29-F687-4f45-9708-019B960494DF}">
-                <a14:hiddenLine xmlns="" xmlns:a14="http://schemas.microsoft.com/office/drawing/2010/main" w="9525">
+                <a14:hiddenLine xmlns:a14="http://schemas.microsoft.com/office/drawing/2010/main" xmlns="" w="9525">
                   <a:solidFill>
                     <a:srgbClr val="000000"/>
                   </a:solidFill>
@@ -760,7 +760,7 @@
             </a:ln>
             <a:extLst>
               <a:ext uri="{91240B29-F687-4f45-9708-019B960494DF}">
-                <a14:hiddenLine xmlns="" xmlns:a14="http://schemas.microsoft.com/office/drawing/2010/main" w="9525">
+                <a14:hiddenLine xmlns:a14="http://schemas.microsoft.com/office/drawing/2010/main" xmlns="" w="9525">
                   <a:solidFill>
                     <a:srgbClr val="000000"/>
                   </a:solidFill>
@@ -822,7 +822,7 @@
             </a:ln>
             <a:extLst>
               <a:ext uri="{91240B29-F687-4f45-9708-019B960494DF}">
-                <a14:hiddenLine xmlns="" xmlns:a14="http://schemas.microsoft.com/office/drawing/2010/main" w="9525">
+                <a14:hiddenLine xmlns:a14="http://schemas.microsoft.com/office/drawing/2010/main" xmlns="" w="9525">
                   <a:solidFill>
                     <a:srgbClr val="000000"/>
                   </a:solidFill>
@@ -884,7 +884,7 @@
             </a:ln>
             <a:extLst>
               <a:ext uri="{91240B29-F687-4f45-9708-019B960494DF}">
-                <a14:hiddenLine xmlns="" xmlns:a14="http://schemas.microsoft.com/office/drawing/2010/main" w="9525">
+                <a14:hiddenLine xmlns:a14="http://schemas.microsoft.com/office/drawing/2010/main" xmlns="" w="9525">
                   <a:solidFill>
                     <a:srgbClr val="000000"/>
                   </a:solidFill>
@@ -974,7 +974,7 @@
             </a:ln>
             <a:extLst>
               <a:ext uri="{91240B29-F687-4f45-9708-019B960494DF}">
-                <a14:hiddenLine xmlns="" xmlns:a14="http://schemas.microsoft.com/office/drawing/2010/main" w="9525">
+                <a14:hiddenLine xmlns:a14="http://schemas.microsoft.com/office/drawing/2010/main" xmlns="" w="9525">
                   <a:solidFill>
                     <a:srgbClr val="000000"/>
                   </a:solidFill>
@@ -1064,7 +1064,7 @@
             </a:ln>
             <a:extLst>
               <a:ext uri="{91240B29-F687-4f45-9708-019B960494DF}">
-                <a14:hiddenLine xmlns="" xmlns:a14="http://schemas.microsoft.com/office/drawing/2010/main" w="9525">
+                <a14:hiddenLine xmlns:a14="http://schemas.microsoft.com/office/drawing/2010/main" xmlns="" w="9525">
                   <a:solidFill>
                     <a:srgbClr val="000000"/>
                   </a:solidFill>
@@ -1126,7 +1126,7 @@
             </a:ln>
             <a:extLst>
               <a:ext uri="{91240B29-F687-4f45-9708-019B960494DF}">
-                <a14:hiddenLine xmlns="" xmlns:a14="http://schemas.microsoft.com/office/drawing/2010/main" w="9525">
+                <a14:hiddenLine xmlns:a14="http://schemas.microsoft.com/office/drawing/2010/main" xmlns="" w="9525">
                   <a:solidFill>
                     <a:srgbClr val="000000"/>
                   </a:solidFill>
@@ -1236,7 +1236,7 @@
             </a:ln>
             <a:extLst>
               <a:ext uri="{91240B29-F687-4f45-9708-019B960494DF}">
-                <a14:hiddenLine xmlns="" xmlns:a14="http://schemas.microsoft.com/office/drawing/2010/main" w="9525">
+                <a14:hiddenLine xmlns:a14="http://schemas.microsoft.com/office/drawing/2010/main" xmlns="" w="9525">
                   <a:solidFill>
                     <a:srgbClr val="000000"/>
                   </a:solidFill>
@@ -1298,7 +1298,7 @@
             </a:ln>
             <a:extLst>
               <a:ext uri="{91240B29-F687-4f45-9708-019B960494DF}">
-                <a14:hiddenLine xmlns="" xmlns:a14="http://schemas.microsoft.com/office/drawing/2010/main" w="9525">
+                <a14:hiddenLine xmlns:a14="http://schemas.microsoft.com/office/drawing/2010/main" xmlns="" w="9525">
                   <a:solidFill>
                     <a:srgbClr val="000000"/>
                   </a:solidFill>
@@ -1388,7 +1388,7 @@
             </a:ln>
             <a:extLst>
               <a:ext uri="{91240B29-F687-4f45-9708-019B960494DF}">
-                <a14:hiddenLine xmlns="" xmlns:a14="http://schemas.microsoft.com/office/drawing/2010/main" w="9525">
+                <a14:hiddenLine xmlns:a14="http://schemas.microsoft.com/office/drawing/2010/main" xmlns="" w="9525">
                   <a:solidFill>
                     <a:srgbClr val="000000"/>
                   </a:solidFill>
@@ -1478,7 +1478,7 @@
             </a:ln>
             <a:extLst>
               <a:ext uri="{91240B29-F687-4f45-9708-019B960494DF}">
-                <a14:hiddenLine xmlns="" xmlns:a14="http://schemas.microsoft.com/office/drawing/2010/main" w="9525">
+                <a14:hiddenLine xmlns:a14="http://schemas.microsoft.com/office/drawing/2010/main" xmlns="" w="9525">
                   <a:solidFill>
                     <a:srgbClr val="000000"/>
                   </a:solidFill>
@@ -1540,7 +1540,7 @@
             </a:ln>
             <a:extLst>
               <a:ext uri="{91240B29-F687-4f45-9708-019B960494DF}">
-                <a14:hiddenLine xmlns="" xmlns:a14="http://schemas.microsoft.com/office/drawing/2010/main" w="9525">
+                <a14:hiddenLine xmlns:a14="http://schemas.microsoft.com/office/drawing/2010/main" xmlns="" w="9525">
                   <a:solidFill>
                     <a:srgbClr val="000000"/>
                   </a:solidFill>
@@ -1630,7 +1630,7 @@
             </a:ln>
             <a:extLst>
               <a:ext uri="{91240B29-F687-4f45-9708-019B960494DF}">
-                <a14:hiddenLine xmlns="" xmlns:a14="http://schemas.microsoft.com/office/drawing/2010/main" w="9525">
+                <a14:hiddenLine xmlns:a14="http://schemas.microsoft.com/office/drawing/2010/main" xmlns="" w="9525">
                   <a:solidFill>
                     <a:srgbClr val="000000"/>
                   </a:solidFill>
@@ -1720,7 +1720,7 @@
             </a:ln>
             <a:extLst>
               <a:ext uri="{91240B29-F687-4f45-9708-019B960494DF}">
-                <a14:hiddenLine xmlns="" xmlns:a14="http://schemas.microsoft.com/office/drawing/2010/main" w="9525">
+                <a14:hiddenLine xmlns:a14="http://schemas.microsoft.com/office/drawing/2010/main" xmlns="" w="9525">
                   <a:solidFill>
                     <a:srgbClr val="000000"/>
                   </a:solidFill>
@@ -1776,7 +1776,7 @@
             </a:ln>
             <a:extLst>
               <a:ext uri="{91240B29-F687-4f45-9708-019B960494DF}">
-                <a14:hiddenLine xmlns="" xmlns:a14="http://schemas.microsoft.com/office/drawing/2010/main" w="9525">
+                <a14:hiddenLine xmlns:a14="http://schemas.microsoft.com/office/drawing/2010/main" xmlns="" w="9525">
                   <a:solidFill>
                     <a:srgbClr val="000000"/>
                   </a:solidFill>
@@ -1866,7 +1866,7 @@
             </a:ln>
             <a:extLst>
               <a:ext uri="{91240B29-F687-4f45-9708-019B960494DF}">
-                <a14:hiddenLine xmlns="" xmlns:a14="http://schemas.microsoft.com/office/drawing/2010/main" w="9525">
+                <a14:hiddenLine xmlns:a14="http://schemas.microsoft.com/office/drawing/2010/main" xmlns="" w="9525">
                   <a:solidFill>
                     <a:srgbClr val="000000"/>
                   </a:solidFill>
@@ -1922,7 +1922,7 @@
             </a:ln>
             <a:extLst>
               <a:ext uri="{91240B29-F687-4f45-9708-019B960494DF}">
-                <a14:hiddenLine xmlns="" xmlns:a14="http://schemas.microsoft.com/office/drawing/2010/main" w="9525">
+                <a14:hiddenLine xmlns:a14="http://schemas.microsoft.com/office/drawing/2010/main" xmlns="" w="9525">
                   <a:solidFill>
                     <a:srgbClr val="000000"/>
                   </a:solidFill>
@@ -2012,7 +2012,7 @@
             </a:ln>
             <a:extLst>
               <a:ext uri="{91240B29-F687-4f45-9708-019B960494DF}">
-                <a14:hiddenLine xmlns="" xmlns:a14="http://schemas.microsoft.com/office/drawing/2010/main" w="9525">
+                <a14:hiddenLine xmlns:a14="http://schemas.microsoft.com/office/drawing/2010/main" xmlns="" w="9525">
                   <a:solidFill>
                     <a:srgbClr val="000000"/>
                   </a:solidFill>
@@ -2080,7 +2080,7 @@
             </a:ln>
             <a:extLst>
               <a:ext uri="{91240B29-F687-4f45-9708-019B960494DF}">
-                <a14:hiddenLine xmlns="" xmlns:a14="http://schemas.microsoft.com/office/drawing/2010/main" w="9525">
+                <a14:hiddenLine xmlns:a14="http://schemas.microsoft.com/office/drawing/2010/main" xmlns="" w="9525">
                   <a:solidFill>
                     <a:srgbClr val="000000"/>
                   </a:solidFill>
@@ -2170,7 +2170,7 @@
             </a:ln>
             <a:extLst>
               <a:ext uri="{91240B29-F687-4f45-9708-019B960494DF}">
-                <a14:hiddenLine xmlns="" xmlns:a14="http://schemas.microsoft.com/office/drawing/2010/main" w="9525">
+                <a14:hiddenLine xmlns:a14="http://schemas.microsoft.com/office/drawing/2010/main" xmlns="" w="9525">
                   <a:solidFill>
                     <a:srgbClr val="000000"/>
                   </a:solidFill>
@@ -2238,7 +2238,7 @@
             </a:ln>
             <a:extLst>
               <a:ext uri="{91240B29-F687-4f45-9708-019B960494DF}">
-                <a14:hiddenLine xmlns="" xmlns:a14="http://schemas.microsoft.com/office/drawing/2010/main" w="9525">
+                <a14:hiddenLine xmlns:a14="http://schemas.microsoft.com/office/drawing/2010/main" xmlns="" w="9525">
                   <a:solidFill>
                     <a:srgbClr val="000000"/>
                   </a:solidFill>
@@ -2328,7 +2328,7 @@
             </a:ln>
             <a:extLst>
               <a:ext uri="{91240B29-F687-4f45-9708-019B960494DF}">
-                <a14:hiddenLine xmlns="" xmlns:a14="http://schemas.microsoft.com/office/drawing/2010/main" w="9525">
+                <a14:hiddenLine xmlns:a14="http://schemas.microsoft.com/office/drawing/2010/main" xmlns="" w="9525">
                   <a:solidFill>
                     <a:srgbClr val="000000"/>
                   </a:solidFill>
@@ -2362,7 +2362,7 @@
             </a:ln>
             <a:extLst>
               <a:ext uri="{91240B29-F687-4f45-9708-019B960494DF}">
-                <a14:hiddenLine xmlns="" xmlns:a14="http://schemas.microsoft.com/office/drawing/2010/main" w="9525">
+                <a14:hiddenLine xmlns:a14="http://schemas.microsoft.com/office/drawing/2010/main" xmlns="" w="9525">
                   <a:solidFill>
                     <a:srgbClr val="000000"/>
                   </a:solidFill>
@@ -2452,7 +2452,7 @@
             </a:ln>
             <a:extLst>
               <a:ext uri="{91240B29-F687-4f45-9708-019B960494DF}">
-                <a14:hiddenLine xmlns="" xmlns:a14="http://schemas.microsoft.com/office/drawing/2010/main" w="9525">
+                <a14:hiddenLine xmlns:a14="http://schemas.microsoft.com/office/drawing/2010/main" xmlns="" w="9525">
                   <a:solidFill>
                     <a:srgbClr val="000000"/>
                   </a:solidFill>
@@ -2514,7 +2514,7 @@
             </a:ln>
             <a:extLst>
               <a:ext uri="{91240B29-F687-4f45-9708-019B960494DF}">
-                <a14:hiddenLine xmlns="" xmlns:a14="http://schemas.microsoft.com/office/drawing/2010/main" w="9525">
+                <a14:hiddenLine xmlns:a14="http://schemas.microsoft.com/office/drawing/2010/main" xmlns="" w="9525">
                   <a:solidFill>
                     <a:srgbClr val="000000"/>
                   </a:solidFill>
@@ -2576,7 +2576,7 @@
             </a:ln>
             <a:extLst>
               <a:ext uri="{91240B29-F687-4f45-9708-019B960494DF}">
-                <a14:hiddenLine xmlns="" xmlns:a14="http://schemas.microsoft.com/office/drawing/2010/main" w="9525">
+                <a14:hiddenLine xmlns:a14="http://schemas.microsoft.com/office/drawing/2010/main" xmlns="" w="9525">
                   <a:solidFill>
                     <a:srgbClr val="000000"/>
                   </a:solidFill>
@@ -2666,7 +2666,7 @@
             </a:ln>
             <a:extLst>
               <a:ext uri="{91240B29-F687-4f45-9708-019B960494DF}">
-                <a14:hiddenLine xmlns="" xmlns:a14="http://schemas.microsoft.com/office/drawing/2010/main" w="9525">
+                <a14:hiddenLine xmlns:a14="http://schemas.microsoft.com/office/drawing/2010/main" xmlns="" w="9525">
                   <a:solidFill>
                     <a:srgbClr val="000000"/>
                   </a:solidFill>
@@ -2734,7 +2734,7 @@
             </a:ln>
             <a:extLst>
               <a:ext uri="{91240B29-F687-4f45-9708-019B960494DF}">
-                <a14:hiddenLine xmlns="" xmlns:a14="http://schemas.microsoft.com/office/drawing/2010/main" w="9525">
+                <a14:hiddenLine xmlns:a14="http://schemas.microsoft.com/office/drawing/2010/main" xmlns="" w="9525">
                   <a:solidFill>
                     <a:srgbClr val="000000"/>
                   </a:solidFill>
@@ -2796,7 +2796,7 @@
             </a:ln>
             <a:extLst>
               <a:ext uri="{91240B29-F687-4f45-9708-019B960494DF}">
-                <a14:hiddenLine xmlns="" xmlns:a14="http://schemas.microsoft.com/office/drawing/2010/main" w="9525">
+                <a14:hiddenLine xmlns:a14="http://schemas.microsoft.com/office/drawing/2010/main" xmlns="" w="9525">
                   <a:solidFill>
                     <a:srgbClr val="000000"/>
                   </a:solidFill>
@@ -2886,7 +2886,7 @@
             </a:ln>
             <a:extLst>
               <a:ext uri="{91240B29-F687-4f45-9708-019B960494DF}">
-                <a14:hiddenLine xmlns="" xmlns:a14="http://schemas.microsoft.com/office/drawing/2010/main" w="9525">
+                <a14:hiddenLine xmlns:a14="http://schemas.microsoft.com/office/drawing/2010/main" xmlns="" w="9525">
                   <a:solidFill>
                     <a:srgbClr val="000000"/>
                   </a:solidFill>
@@ -2948,7 +2948,7 @@
             </a:ln>
             <a:extLst>
               <a:ext uri="{91240B29-F687-4f45-9708-019B960494DF}">
-                <a14:hiddenLine xmlns="" xmlns:a14="http://schemas.microsoft.com/office/drawing/2010/main" w="9525">
+                <a14:hiddenLine xmlns:a14="http://schemas.microsoft.com/office/drawing/2010/main" xmlns="" w="9525">
                   <a:solidFill>
                     <a:srgbClr val="000000"/>
                   </a:solidFill>
@@ -3038,7 +3038,7 @@
             </a:ln>
             <a:extLst>
               <a:ext uri="{91240B29-F687-4f45-9708-019B960494DF}">
-                <a14:hiddenLine xmlns="" xmlns:a14="http://schemas.microsoft.com/office/drawing/2010/main" w="9525">
+                <a14:hiddenLine xmlns:a14="http://schemas.microsoft.com/office/drawing/2010/main" xmlns="" w="9525">
                   <a:solidFill>
                     <a:srgbClr val="000000"/>
                   </a:solidFill>
@@ -3100,7 +3100,7 @@
             </a:ln>
             <a:extLst>
               <a:ext uri="{91240B29-F687-4f45-9708-019B960494DF}">
-                <a14:hiddenLine xmlns="" xmlns:a14="http://schemas.microsoft.com/office/drawing/2010/main" w="9525">
+                <a14:hiddenLine xmlns:a14="http://schemas.microsoft.com/office/drawing/2010/main" xmlns="" w="9525">
                   <a:solidFill>
                     <a:srgbClr val="000000"/>
                   </a:solidFill>
@@ -3190,7 +3190,7 @@
             </a:ln>
             <a:extLst>
               <a:ext uri="{91240B29-F687-4f45-9708-019B960494DF}">
-                <a14:hiddenLine xmlns="" xmlns:a14="http://schemas.microsoft.com/office/drawing/2010/main" w="9525">
+                <a14:hiddenLine xmlns:a14="http://schemas.microsoft.com/office/drawing/2010/main" xmlns="" w="9525">
                   <a:solidFill>
                     <a:srgbClr val="000000"/>
                   </a:solidFill>
@@ -3224,7 +3224,7 @@
             </a:ln>
             <a:extLst>
               <a:ext uri="{91240B29-F687-4f45-9708-019B960494DF}">
-                <a14:hiddenLine xmlns="" xmlns:a14="http://schemas.microsoft.com/office/drawing/2010/main" w="9525">
+                <a14:hiddenLine xmlns:a14="http://schemas.microsoft.com/office/drawing/2010/main" xmlns="" w="9525">
                   <a:solidFill>
                     <a:srgbClr val="000000"/>
                   </a:solidFill>
@@ -3289,7 +3289,7 @@
             </a:ln>
             <a:extLst>
               <a:ext uri="{91240B29-F687-4f45-9708-019B960494DF}">
-                <a14:hiddenLine xmlns="" xmlns:a14="http://schemas.microsoft.com/office/drawing/2010/main" w="9525">
+                <a14:hiddenLine xmlns:a14="http://schemas.microsoft.com/office/drawing/2010/main" xmlns="" w="9525">
                   <a:solidFill>
                     <a:srgbClr val="000000"/>
                   </a:solidFill>
@@ -3379,7 +3379,7 @@
             </a:ln>
             <a:extLst>
               <a:ext uri="{91240B29-F687-4f45-9708-019B960494DF}">
-                <a14:hiddenLine xmlns="" xmlns:a14="http://schemas.microsoft.com/office/drawing/2010/main" w="9525">
+                <a14:hiddenLine xmlns:a14="http://schemas.microsoft.com/office/drawing/2010/main" xmlns="" w="9525">
                   <a:solidFill>
                     <a:srgbClr val="000000"/>
                   </a:solidFill>
@@ -3441,7 +3441,7 @@
             </a:ln>
             <a:extLst>
               <a:ext uri="{91240B29-F687-4f45-9708-019B960494DF}">
-                <a14:hiddenLine xmlns="" xmlns:a14="http://schemas.microsoft.com/office/drawing/2010/main" w="9525">
+                <a14:hiddenLine xmlns:a14="http://schemas.microsoft.com/office/drawing/2010/main" xmlns="" w="9525">
                   <a:solidFill>
                     <a:srgbClr val="000000"/>
                   </a:solidFill>
@@ -3531,7 +3531,7 @@
             </a:ln>
             <a:extLst>
               <a:ext uri="{91240B29-F687-4f45-9708-019B960494DF}">
-                <a14:hiddenLine xmlns="" xmlns:a14="http://schemas.microsoft.com/office/drawing/2010/main" w="9525">
+                <a14:hiddenLine xmlns:a14="http://schemas.microsoft.com/office/drawing/2010/main" xmlns="" w="9525">
                   <a:solidFill>
                     <a:srgbClr val="000000"/>
                   </a:solidFill>
@@ -3621,7 +3621,7 @@
             </a:ln>
             <a:extLst>
               <a:ext uri="{91240B29-F687-4f45-9708-019B960494DF}">
-                <a14:hiddenLine xmlns="" xmlns:a14="http://schemas.microsoft.com/office/drawing/2010/main" w="9525">
+                <a14:hiddenLine xmlns:a14="http://schemas.microsoft.com/office/drawing/2010/main" xmlns="" w="9525">
                   <a:solidFill>
                     <a:srgbClr val="000000"/>
                   </a:solidFill>
@@ -3686,7 +3686,7 @@
             </a:ln>
             <a:extLst>
               <a:ext uri="{91240B29-F687-4f45-9708-019B960494DF}">
-                <a14:hiddenLine xmlns="" xmlns:a14="http://schemas.microsoft.com/office/drawing/2010/main" w="9525">
+                <a14:hiddenLine xmlns:a14="http://schemas.microsoft.com/office/drawing/2010/main" xmlns="" w="9525">
                   <a:solidFill>
                     <a:srgbClr val="000000"/>
                   </a:solidFill>
@@ -3748,7 +3748,7 @@
             </a:ln>
             <a:extLst>
               <a:ext uri="{91240B29-F687-4f45-9708-019B960494DF}">
-                <a14:hiddenLine xmlns="" xmlns:a14="http://schemas.microsoft.com/office/drawing/2010/main" w="9525">
+                <a14:hiddenLine xmlns:a14="http://schemas.microsoft.com/office/drawing/2010/main" xmlns="" w="9525">
                   <a:solidFill>
                     <a:srgbClr val="000000"/>
                   </a:solidFill>
@@ -3838,7 +3838,7 @@
             </a:ln>
             <a:extLst>
               <a:ext uri="{91240B29-F687-4f45-9708-019B960494DF}">
-                <a14:hiddenLine xmlns="" xmlns:a14="http://schemas.microsoft.com/office/drawing/2010/main" w="9525">
+                <a14:hiddenLine xmlns:a14="http://schemas.microsoft.com/office/drawing/2010/main" xmlns="" w="9525">
                   <a:solidFill>
                     <a:srgbClr val="000000"/>
                   </a:solidFill>
@@ -3928,7 +3928,7 @@
             </a:ln>
             <a:extLst>
               <a:ext uri="{91240B29-F687-4f45-9708-019B960494DF}">
-                <a14:hiddenLine xmlns="" xmlns:a14="http://schemas.microsoft.com/office/drawing/2010/main" w="9525">
+                <a14:hiddenLine xmlns:a14="http://schemas.microsoft.com/office/drawing/2010/main" xmlns="" w="9525">
                   <a:solidFill>
                     <a:srgbClr val="000000"/>
                   </a:solidFill>
@@ -3990,7 +3990,7 @@
             </a:ln>
             <a:extLst>
               <a:ext uri="{91240B29-F687-4f45-9708-019B960494DF}">
-                <a14:hiddenLine xmlns="" xmlns:a14="http://schemas.microsoft.com/office/drawing/2010/main" w="9525">
+                <a14:hiddenLine xmlns:a14="http://schemas.microsoft.com/office/drawing/2010/main" xmlns="" w="9525">
                   <a:solidFill>
                     <a:srgbClr val="000000"/>
                   </a:solidFill>
@@ -4110,7 +4110,7 @@
             </a:ln>
             <a:extLst>
               <a:ext uri="{91240B29-F687-4f45-9708-019B960494DF}">
-                <a14:hiddenLine xmlns="" xmlns:a14="http://schemas.microsoft.com/office/drawing/2010/main" w="9525">
+                <a14:hiddenLine xmlns:a14="http://schemas.microsoft.com/office/drawing/2010/main" xmlns="" w="9525">
                   <a:solidFill>
                     <a:srgbClr val="000000"/>
                   </a:solidFill>
@@ -4178,7 +4178,7 @@
             </a:ln>
             <a:extLst>
               <a:ext uri="{91240B29-F687-4f45-9708-019B960494DF}">
-                <a14:hiddenLine xmlns="" xmlns:a14="http://schemas.microsoft.com/office/drawing/2010/main" w="9525">
+                <a14:hiddenLine xmlns:a14="http://schemas.microsoft.com/office/drawing/2010/main" xmlns="" w="9525">
                   <a:solidFill>
                     <a:srgbClr val="000000"/>
                   </a:solidFill>
@@ -4268,7 +4268,7 @@
             </a:ln>
             <a:extLst>
               <a:ext uri="{91240B29-F687-4f45-9708-019B960494DF}">
-                <a14:hiddenLine xmlns="" xmlns:a14="http://schemas.microsoft.com/office/drawing/2010/main" w="9525">
+                <a14:hiddenLine xmlns:a14="http://schemas.microsoft.com/office/drawing/2010/main" xmlns="" w="9525">
                   <a:solidFill>
                     <a:srgbClr val="000000"/>
                   </a:solidFill>
@@ -8997,7 +8997,7 @@
           <a:noFill/>
           <a:extLst>
             <a:ext uri="{909E8E84-426E-40dd-AFC4-6F175D3DCCD1}">
-              <a14:hiddenFill xmlns="" xmlns:a14="http://schemas.microsoft.com/office/drawing/2010/main">
+              <a14:hiddenFill xmlns:a14="http://schemas.microsoft.com/office/drawing/2010/main" xmlns="">
                 <a:solidFill>
                   <a:srgbClr val="FFFFFF"/>
                 </a:solidFill>
@@ -9071,7 +9071,7 @@
               </a:ln>
               <a:extLst>
                 <a:ext uri="{91240B29-F687-4f45-9708-019B960494DF}">
-                  <a14:hiddenLine xmlns="" xmlns:a14="http://schemas.microsoft.com/office/drawing/2010/main" w="9525">
+                  <a14:hiddenLine xmlns:a14="http://schemas.microsoft.com/office/drawing/2010/main" xmlns="" w="9525">
                     <a:solidFill>
                       <a:srgbClr val="000000"/>
                     </a:solidFill>
@@ -9161,7 +9161,7 @@
               </a:ln>
               <a:extLst>
                 <a:ext uri="{91240B29-F687-4f45-9708-019B960494DF}">
-                  <a14:hiddenLine xmlns="" xmlns:a14="http://schemas.microsoft.com/office/drawing/2010/main" w="9525">
+                  <a14:hiddenLine xmlns:a14="http://schemas.microsoft.com/office/drawing/2010/main" xmlns="" w="9525">
                     <a:solidFill>
                       <a:srgbClr val="000000"/>
                     </a:solidFill>
@@ -9251,7 +9251,7 @@
               </a:ln>
               <a:extLst>
                 <a:ext uri="{91240B29-F687-4f45-9708-019B960494DF}">
-                  <a14:hiddenLine xmlns="" xmlns:a14="http://schemas.microsoft.com/office/drawing/2010/main" w="9525">
+                  <a14:hiddenLine xmlns:a14="http://schemas.microsoft.com/office/drawing/2010/main" xmlns="" w="9525">
                     <a:solidFill>
                       <a:srgbClr val="000000"/>
                     </a:solidFill>
@@ -9313,7 +9313,7 @@
               </a:ln>
               <a:extLst>
                 <a:ext uri="{91240B29-F687-4f45-9708-019B960494DF}">
-                  <a14:hiddenLine xmlns="" xmlns:a14="http://schemas.microsoft.com/office/drawing/2010/main" w="9525">
+                  <a14:hiddenLine xmlns:a14="http://schemas.microsoft.com/office/drawing/2010/main" xmlns="" w="9525">
                     <a:solidFill>
                       <a:srgbClr val="000000"/>
                     </a:solidFill>
@@ -9403,7 +9403,7 @@
               </a:ln>
               <a:extLst>
                 <a:ext uri="{91240B29-F687-4f45-9708-019B960494DF}">
-                  <a14:hiddenLine xmlns="" xmlns:a14="http://schemas.microsoft.com/office/drawing/2010/main" w="9525">
+                  <a14:hiddenLine xmlns:a14="http://schemas.microsoft.com/office/drawing/2010/main" xmlns="" w="9525">
                     <a:solidFill>
                       <a:srgbClr val="000000"/>
                     </a:solidFill>
@@ -9465,7 +9465,7 @@
               </a:ln>
               <a:extLst>
                 <a:ext uri="{91240B29-F687-4f45-9708-019B960494DF}">
-                  <a14:hiddenLine xmlns="" xmlns:a14="http://schemas.microsoft.com/office/drawing/2010/main" w="9525">
+                  <a14:hiddenLine xmlns:a14="http://schemas.microsoft.com/office/drawing/2010/main" xmlns="" w="9525">
                     <a:solidFill>
                       <a:srgbClr val="000000"/>
                     </a:solidFill>
@@ -9527,7 +9527,7 @@
               </a:ln>
               <a:extLst>
                 <a:ext uri="{91240B29-F687-4f45-9708-019B960494DF}">
-                  <a14:hiddenLine xmlns="" xmlns:a14="http://schemas.microsoft.com/office/drawing/2010/main" w="9525">
+                  <a14:hiddenLine xmlns:a14="http://schemas.microsoft.com/office/drawing/2010/main" xmlns="" w="9525">
                     <a:solidFill>
                       <a:srgbClr val="000000"/>
                     </a:solidFill>
@@ -9617,7 +9617,7 @@
               </a:ln>
               <a:extLst>
                 <a:ext uri="{91240B29-F687-4f45-9708-019B960494DF}">
-                  <a14:hiddenLine xmlns="" xmlns:a14="http://schemas.microsoft.com/office/drawing/2010/main" w="9525">
+                  <a14:hiddenLine xmlns:a14="http://schemas.microsoft.com/office/drawing/2010/main" xmlns="" w="9525">
                     <a:solidFill>
                       <a:srgbClr val="000000"/>
                     </a:solidFill>
@@ -9707,7 +9707,7 @@
               </a:ln>
               <a:extLst>
                 <a:ext uri="{91240B29-F687-4f45-9708-019B960494DF}">
-                  <a14:hiddenLine xmlns="" xmlns:a14="http://schemas.microsoft.com/office/drawing/2010/main" w="9525">
+                  <a14:hiddenLine xmlns:a14="http://schemas.microsoft.com/office/drawing/2010/main" xmlns="" w="9525">
                     <a:solidFill>
                       <a:srgbClr val="000000"/>
                     </a:solidFill>
@@ -9769,7 +9769,7 @@
               </a:ln>
               <a:extLst>
                 <a:ext uri="{91240B29-F687-4f45-9708-019B960494DF}">
-                  <a14:hiddenLine xmlns="" xmlns:a14="http://schemas.microsoft.com/office/drawing/2010/main" w="9525">
+                  <a14:hiddenLine xmlns:a14="http://schemas.microsoft.com/office/drawing/2010/main" xmlns="" w="9525">
                     <a:solidFill>
                       <a:srgbClr val="000000"/>
                     </a:solidFill>
@@ -9879,7 +9879,7 @@
               </a:ln>
               <a:extLst>
                 <a:ext uri="{91240B29-F687-4f45-9708-019B960494DF}">
-                  <a14:hiddenLine xmlns="" xmlns:a14="http://schemas.microsoft.com/office/drawing/2010/main" w="9525">
+                  <a14:hiddenLine xmlns:a14="http://schemas.microsoft.com/office/drawing/2010/main" xmlns="" w="9525">
                     <a:solidFill>
                       <a:srgbClr val="000000"/>
                     </a:solidFill>
@@ -9963,7 +9963,7 @@
               </a:ln>
               <a:extLst>
                 <a:ext uri="{91240B29-F687-4f45-9708-019B960494DF}">
-                  <a14:hiddenLine xmlns="" xmlns:a14="http://schemas.microsoft.com/office/drawing/2010/main" w="9525">
+                  <a14:hiddenLine xmlns:a14="http://schemas.microsoft.com/office/drawing/2010/main" xmlns="" w="9525">
                     <a:solidFill>
                       <a:srgbClr val="000000"/>
                     </a:solidFill>
@@ -10025,7 +10025,7 @@
               </a:ln>
               <a:extLst>
                 <a:ext uri="{91240B29-F687-4f45-9708-019B960494DF}">
-                  <a14:hiddenLine xmlns="" xmlns:a14="http://schemas.microsoft.com/office/drawing/2010/main" w="9525">
+                  <a14:hiddenLine xmlns:a14="http://schemas.microsoft.com/office/drawing/2010/main" xmlns="" w="9525">
                     <a:solidFill>
                       <a:srgbClr val="000000"/>
                     </a:solidFill>
@@ -10087,7 +10087,7 @@
               </a:ln>
               <a:extLst>
                 <a:ext uri="{91240B29-F687-4f45-9708-019B960494DF}">
-                  <a14:hiddenLine xmlns="" xmlns:a14="http://schemas.microsoft.com/office/drawing/2010/main" w="9525">
+                  <a14:hiddenLine xmlns:a14="http://schemas.microsoft.com/office/drawing/2010/main" xmlns="" w="9525">
                     <a:solidFill>
                       <a:srgbClr val="000000"/>
                     </a:solidFill>
@@ -10177,7 +10177,7 @@
               </a:ln>
               <a:extLst>
                 <a:ext uri="{91240B29-F687-4f45-9708-019B960494DF}">
-                  <a14:hiddenLine xmlns="" xmlns:a14="http://schemas.microsoft.com/office/drawing/2010/main" w="9525">
+                  <a14:hiddenLine xmlns:a14="http://schemas.microsoft.com/office/drawing/2010/main" xmlns="" w="9525">
                     <a:solidFill>
                       <a:srgbClr val="000000"/>
                     </a:solidFill>
@@ -10211,7 +10211,7 @@
               </a:ln>
               <a:extLst>
                 <a:ext uri="{91240B29-F687-4f45-9708-019B960494DF}">
-                  <a14:hiddenLine xmlns="" xmlns:a14="http://schemas.microsoft.com/office/drawing/2010/main" w="9525">
+                  <a14:hiddenLine xmlns:a14="http://schemas.microsoft.com/office/drawing/2010/main" xmlns="" w="9525">
                     <a:solidFill>
                       <a:srgbClr val="000000"/>
                     </a:solidFill>
@@ -10276,7 +10276,7 @@
               </a:ln>
               <a:extLst>
                 <a:ext uri="{91240B29-F687-4f45-9708-019B960494DF}">
-                  <a14:hiddenLine xmlns="" xmlns:a14="http://schemas.microsoft.com/office/drawing/2010/main" w="9525">
+                  <a14:hiddenLine xmlns:a14="http://schemas.microsoft.com/office/drawing/2010/main" xmlns="" w="9525">
                     <a:solidFill>
                       <a:srgbClr val="000000"/>
                     </a:solidFill>
@@ -10366,7 +10366,7 @@
               </a:ln>
               <a:extLst>
                 <a:ext uri="{91240B29-F687-4f45-9708-019B960494DF}">
-                  <a14:hiddenLine xmlns="" xmlns:a14="http://schemas.microsoft.com/office/drawing/2010/main" w="9525">
+                  <a14:hiddenLine xmlns:a14="http://schemas.microsoft.com/office/drawing/2010/main" xmlns="" w="9525">
                     <a:solidFill>
                       <a:srgbClr val="000000"/>
                     </a:solidFill>
@@ -10428,7 +10428,7 @@
               </a:ln>
               <a:extLst>
                 <a:ext uri="{91240B29-F687-4f45-9708-019B960494DF}">
-                  <a14:hiddenLine xmlns="" xmlns:a14="http://schemas.microsoft.com/office/drawing/2010/main" w="9525">
+                  <a14:hiddenLine xmlns:a14="http://schemas.microsoft.com/office/drawing/2010/main" xmlns="" w="9525">
                     <a:solidFill>
                       <a:srgbClr val="000000"/>
                     </a:solidFill>
@@ -10518,7 +10518,7 @@
               </a:ln>
               <a:extLst>
                 <a:ext uri="{91240B29-F687-4f45-9708-019B960494DF}">
-                  <a14:hiddenLine xmlns="" xmlns:a14="http://schemas.microsoft.com/office/drawing/2010/main" w="9525">
+                  <a14:hiddenLine xmlns:a14="http://schemas.microsoft.com/office/drawing/2010/main" xmlns="" w="9525">
                     <a:solidFill>
                       <a:srgbClr val="000000"/>
                     </a:solidFill>
@@ -10583,7 +10583,7 @@
               </a:ln>
               <a:extLst>
                 <a:ext uri="{91240B29-F687-4f45-9708-019B960494DF}">
-                  <a14:hiddenLine xmlns="" xmlns:a14="http://schemas.microsoft.com/office/drawing/2010/main" w="9525">
+                  <a14:hiddenLine xmlns:a14="http://schemas.microsoft.com/office/drawing/2010/main" xmlns="" w="9525">
                     <a:solidFill>
                       <a:srgbClr val="000000"/>
                     </a:solidFill>
@@ -10645,7 +10645,7 @@
               </a:ln>
               <a:extLst>
                 <a:ext uri="{91240B29-F687-4f45-9708-019B960494DF}">
-                  <a14:hiddenLine xmlns="" xmlns:a14="http://schemas.microsoft.com/office/drawing/2010/main" w="9525">
+                  <a14:hiddenLine xmlns:a14="http://schemas.microsoft.com/office/drawing/2010/main" xmlns="" w="9525">
                     <a:solidFill>
                       <a:srgbClr val="000000"/>
                     </a:solidFill>
@@ -10735,7 +10735,7 @@
               </a:ln>
               <a:extLst>
                 <a:ext uri="{91240B29-F687-4f45-9708-019B960494DF}">
-                  <a14:hiddenLine xmlns="" xmlns:a14="http://schemas.microsoft.com/office/drawing/2010/main" w="9525">
+                  <a14:hiddenLine xmlns:a14="http://schemas.microsoft.com/office/drawing/2010/main" xmlns="" w="9525">
                     <a:solidFill>
                       <a:srgbClr val="000000"/>
                     </a:solidFill>
@@ -10825,7 +10825,7 @@
               </a:ln>
               <a:extLst>
                 <a:ext uri="{91240B29-F687-4f45-9708-019B960494DF}">
-                  <a14:hiddenLine xmlns="" xmlns:a14="http://schemas.microsoft.com/office/drawing/2010/main" w="9525">
+                  <a14:hiddenLine xmlns:a14="http://schemas.microsoft.com/office/drawing/2010/main" xmlns="" w="9525">
                     <a:solidFill>
                       <a:srgbClr val="000000"/>
                     </a:solidFill>
@@ -10890,7 +10890,7 @@
               </a:ln>
               <a:extLst>
                 <a:ext uri="{91240B29-F687-4f45-9708-019B960494DF}">
-                  <a14:hiddenLine xmlns="" xmlns:a14="http://schemas.microsoft.com/office/drawing/2010/main" w="9525">
+                  <a14:hiddenLine xmlns:a14="http://schemas.microsoft.com/office/drawing/2010/main" xmlns="" w="9525">
                     <a:solidFill>
                       <a:srgbClr val="000000"/>
                     </a:solidFill>
@@ -11010,7 +11010,7 @@
               </a:ln>
               <a:extLst>
                 <a:ext uri="{91240B29-F687-4f45-9708-019B960494DF}">
-                  <a14:hiddenLine xmlns="" xmlns:a14="http://schemas.microsoft.com/office/drawing/2010/main" w="9525">
+                  <a14:hiddenLine xmlns:a14="http://schemas.microsoft.com/office/drawing/2010/main" xmlns="" w="9525">
                     <a:solidFill>
                       <a:srgbClr val="000000"/>
                     </a:solidFill>
@@ -11108,7 +11108,7 @@
               </a:ln>
               <a:extLst>
                 <a:ext uri="{91240B29-F687-4f45-9708-019B960494DF}">
-                  <a14:hiddenLine xmlns="" xmlns:a14="http://schemas.microsoft.com/office/drawing/2010/main" w="9525">
+                  <a14:hiddenLine xmlns:a14="http://schemas.microsoft.com/office/drawing/2010/main" xmlns="" w="9525">
                     <a:solidFill>
                       <a:srgbClr val="000000"/>
                     </a:solidFill>
@@ -11223,7 +11223,7 @@
               </a:ln>
               <a:extLst>
                 <a:ext uri="{91240B29-F687-4f45-9708-019B960494DF}">
-                  <a14:hiddenLine xmlns="" xmlns:a14="http://schemas.microsoft.com/office/drawing/2010/main" w="9525">
+                  <a14:hiddenLine xmlns:a14="http://schemas.microsoft.com/office/drawing/2010/main" xmlns="" w="9525">
                     <a:solidFill>
                       <a:srgbClr val="000000"/>
                     </a:solidFill>
@@ -11313,7 +11313,7 @@
               </a:ln>
               <a:extLst>
                 <a:ext uri="{91240B29-F687-4f45-9708-019B960494DF}">
-                  <a14:hiddenLine xmlns="" xmlns:a14="http://schemas.microsoft.com/office/drawing/2010/main" w="9525">
+                  <a14:hiddenLine xmlns:a14="http://schemas.microsoft.com/office/drawing/2010/main" xmlns="" w="9525">
                     <a:solidFill>
                       <a:srgbClr val="000000"/>
                     </a:solidFill>
@@ -11378,7 +11378,7 @@
               </a:ln>
               <a:extLst>
                 <a:ext uri="{91240B29-F687-4f45-9708-019B960494DF}">
-                  <a14:hiddenLine xmlns="" xmlns:a14="http://schemas.microsoft.com/office/drawing/2010/main" w="9525">
+                  <a14:hiddenLine xmlns:a14="http://schemas.microsoft.com/office/drawing/2010/main" xmlns="" w="9525">
                     <a:solidFill>
                       <a:srgbClr val="000000"/>
                     </a:solidFill>
@@ -11468,7 +11468,7 @@
               </a:ln>
               <a:extLst>
                 <a:ext uri="{91240B29-F687-4f45-9708-019B960494DF}">
-                  <a14:hiddenLine xmlns="" xmlns:a14="http://schemas.microsoft.com/office/drawing/2010/main" w="9525">
+                  <a14:hiddenLine xmlns:a14="http://schemas.microsoft.com/office/drawing/2010/main" xmlns="" w="9525">
                     <a:solidFill>
                       <a:srgbClr val="000000"/>
                     </a:solidFill>
@@ -11536,7 +11536,7 @@
               </a:ln>
               <a:extLst>
                 <a:ext uri="{91240B29-F687-4f45-9708-019B960494DF}">
-                  <a14:hiddenLine xmlns="" xmlns:a14="http://schemas.microsoft.com/office/drawing/2010/main" w="9525">
+                  <a14:hiddenLine xmlns:a14="http://schemas.microsoft.com/office/drawing/2010/main" xmlns="" w="9525">
                     <a:solidFill>
                       <a:srgbClr val="000000"/>
                     </a:solidFill>
@@ -11626,7 +11626,7 @@
               </a:ln>
               <a:extLst>
                 <a:ext uri="{91240B29-F687-4f45-9708-019B960494DF}">
-                  <a14:hiddenLine xmlns="" xmlns:a14="http://schemas.microsoft.com/office/drawing/2010/main" w="9525">
+                  <a14:hiddenLine xmlns:a14="http://schemas.microsoft.com/office/drawing/2010/main" xmlns="" w="9525">
                     <a:solidFill>
                       <a:srgbClr val="000000"/>
                     </a:solidFill>
@@ -11694,7 +11694,7 @@
               </a:ln>
               <a:extLst>
                 <a:ext uri="{91240B29-F687-4f45-9708-019B960494DF}">
-                  <a14:hiddenLine xmlns="" xmlns:a14="http://schemas.microsoft.com/office/drawing/2010/main" w="9525">
+                  <a14:hiddenLine xmlns:a14="http://schemas.microsoft.com/office/drawing/2010/main" xmlns="" w="9525">
                     <a:solidFill>
                       <a:srgbClr val="000000"/>
                     </a:solidFill>
@@ -11784,7 +11784,7 @@
               </a:ln>
               <a:extLst>
                 <a:ext uri="{91240B29-F687-4f45-9708-019B960494DF}">
-                  <a14:hiddenLine xmlns="" xmlns:a14="http://schemas.microsoft.com/office/drawing/2010/main" w="9525">
+                  <a14:hiddenLine xmlns:a14="http://schemas.microsoft.com/office/drawing/2010/main" xmlns="" w="9525">
                     <a:solidFill>
                       <a:srgbClr val="000000"/>
                     </a:solidFill>
@@ -11818,7 +11818,7 @@
               </a:ln>
               <a:extLst>
                 <a:ext uri="{91240B29-F687-4f45-9708-019B960494DF}">
-                  <a14:hiddenLine xmlns="" xmlns:a14="http://schemas.microsoft.com/office/drawing/2010/main" w="9525">
+                  <a14:hiddenLine xmlns:a14="http://schemas.microsoft.com/office/drawing/2010/main" xmlns="" w="9525">
                     <a:solidFill>
                       <a:srgbClr val="000000"/>
                     </a:solidFill>
@@ -12950,7 +12950,9 @@
         </p:nvSpPr>
         <p:spPr/>
         <p:txBody>
-          <a:bodyPr/>
+          <a:bodyPr>
+            <a:normAutofit fontScale="77500" lnSpcReduction="20000"/>
+          </a:bodyPr>
           <a:lstStyle/>
           <a:p>
             <a:r>
@@ -12996,6 +12998,36 @@
                 <a:hlinkClick r:id="rId4"/>
               </a:rPr>
               <a:t>https://www.itl.nist.gov/div898/handbook/eda/section3/histogr6.htm</a:t>
+            </a:r>
+            <a:endParaRPr lang="en-US" dirty="0"/>
+          </a:p>
+          <a:p>
+            <a:r>
+              <a:rPr lang="en-US" dirty="0"/>
+              <a:t>Data science, explained by the government (chapter 3 may be of interest, but looks good all </a:t>
+            </a:r>
+            <a:r>
+              <a:rPr lang="en-US"/>
+              <a:t>around): </a:t>
+            </a:r>
+            <a:r>
+              <a:rPr lang="en-US" dirty="0">
+                <a:hlinkClick r:id="rId5"/>
+              </a:rPr>
+              <a:t>https://www.itl.nist.gov/div898/handbook/</a:t>
+            </a:r>
+            <a:endParaRPr lang="en-US" dirty="0"/>
+          </a:p>
+          <a:p>
+            <a:r>
+              <a:rPr lang="en-US" dirty="0"/>
+              <a:t>Basically this chapter, except on Kaggle.  So you get the benefit of all the discussion and other people’s notebooks: </a:t>
+            </a:r>
+            <a:r>
+              <a:rPr lang="en-US" dirty="0">
+                <a:hlinkClick r:id="rId6"/>
+              </a:rPr>
+              <a:t>https://www.kaggle.com/c/house-prices-advanced-regression-techniques</a:t>
             </a:r>
             <a:endParaRPr lang="en-US" dirty="0"/>
           </a:p>
@@ -13163,115 +13195,6 @@
 </file>
 
 <file path=ppt/slides/slide3.xml><?xml version="1.0" encoding="utf-8"?>
-<p:sld xmlns:a="http://schemas.openxmlformats.org/drawingml/2006/main" xmlns:r="http://schemas.openxmlformats.org/officeDocument/2006/relationships" xmlns:p="http://schemas.openxmlformats.org/presentationml/2006/main">
-  <p:cSld>
-    <p:spTree>
-      <p:nvGrpSpPr>
-        <p:cNvPr id="1" name=""/>
-        <p:cNvGrpSpPr/>
-        <p:nvPr/>
-      </p:nvGrpSpPr>
-      <p:grpSpPr>
-        <a:xfrm>
-          <a:off x="0" y="0"/>
-          <a:ext cx="0" cy="0"/>
-          <a:chOff x="0" y="0"/>
-          <a:chExt cx="0" cy="0"/>
-        </a:xfrm>
-      </p:grpSpPr>
-      <p:sp>
-        <p:nvSpPr>
-          <p:cNvPr id="2" name="Title 1">
-            <a:extLst>
-              <a:ext uri="{FF2B5EF4-FFF2-40B4-BE49-F238E27FC236}">
-                <a16:creationId xmlns:a16="http://schemas.microsoft.com/office/drawing/2014/main" id="{B98EC121-6412-41E3-9FAF-7FC75B58DB05}"/>
-              </a:ext>
-            </a:extLst>
-          </p:cNvPr>
-          <p:cNvSpPr>
-            <a:spLocks noGrp="1"/>
-          </p:cNvSpPr>
-          <p:nvPr>
-            <p:ph type="title"/>
-          </p:nvPr>
-        </p:nvSpPr>
-        <p:spPr/>
-        <p:txBody>
-          <a:bodyPr/>
-          <a:lstStyle/>
-          <a:p>
-            <a:r>
-              <a:rPr lang="en-US" dirty="0"/>
-              <a:t>“Some Algorithms” overview</a:t>
-            </a:r>
-          </a:p>
-        </p:txBody>
-      </p:sp>
-      <p:sp>
-        <p:nvSpPr>
-          <p:cNvPr id="3" name="Content Placeholder 2">
-            <a:extLst>
-              <a:ext uri="{FF2B5EF4-FFF2-40B4-BE49-F238E27FC236}">
-                <a16:creationId xmlns:a16="http://schemas.microsoft.com/office/drawing/2014/main" id="{5E59D970-62AF-4D9D-A41A-076D843D911E}"/>
-              </a:ext>
-            </a:extLst>
-          </p:cNvPr>
-          <p:cNvSpPr>
-            <a:spLocks noGrp="1"/>
-          </p:cNvSpPr>
-          <p:nvPr>
-            <p:ph idx="1"/>
-          </p:nvPr>
-        </p:nvSpPr>
-        <p:spPr/>
-        <p:txBody>
-          <a:bodyPr>
-            <a:normAutofit/>
-          </a:bodyPr>
-          <a:lstStyle/>
-          <a:p>
-            <a:r>
-              <a:rPr lang="en-US" dirty="0"/>
-              <a:t>It will be harder for some algorithms to detect patterns if data is skewed, pg. 49</a:t>
-            </a:r>
-          </a:p>
-          <a:p>
-            <a:r>
-              <a:rPr lang="en-US" dirty="0"/>
-              <a:t>Most algorithms cannot work with missing features, pg. 61</a:t>
-            </a:r>
-          </a:p>
-          <a:p>
-            <a:r>
-              <a:rPr lang="en-US" dirty="0"/>
-              <a:t>Most algorithms prefer to work with numbers, pg. 63</a:t>
-            </a:r>
-          </a:p>
-          <a:p>
-            <a:r>
-              <a:rPr lang="en-US" dirty="0"/>
-              <a:t>Most algorithms don’t perform well when the input numerical attributes have different scales, pg. 66</a:t>
-            </a:r>
-          </a:p>
-          <a:p>
-            <a:endParaRPr lang="en-US" dirty="0"/>
-          </a:p>
-        </p:txBody>
-      </p:sp>
-    </p:spTree>
-    <p:extLst>
-      <p:ext uri="{BB962C8B-B14F-4D97-AF65-F5344CB8AC3E}">
-        <p14:creationId xmlns:p14="http://schemas.microsoft.com/office/powerpoint/2010/main" val="558078344"/>
-      </p:ext>
-    </p:extLst>
-  </p:cSld>
-  <p:clrMapOvr>
-    <a:masterClrMapping/>
-  </p:clrMapOvr>
-</p:sld>
-</file>
-
-<file path=ppt/slides/slide4.xml><?xml version="1.0" encoding="utf-8"?>
 <p:sld xmlns:a="http://schemas.openxmlformats.org/drawingml/2006/main" xmlns:r="http://schemas.openxmlformats.org/officeDocument/2006/relationships" xmlns:p="http://schemas.openxmlformats.org/presentationml/2006/main">
   <p:cSld>
     <p:spTree>
@@ -13760,7 +13683,7 @@
 </p:sld>
 </file>
 
-<file path=ppt/slides/slide5.xml><?xml version="1.0" encoding="utf-8"?>
+<file path=ppt/slides/slide4.xml><?xml version="1.0" encoding="utf-8"?>
 <p:sld xmlns:a="http://schemas.openxmlformats.org/drawingml/2006/main" xmlns:r="http://schemas.openxmlformats.org/officeDocument/2006/relationships" xmlns:p="http://schemas.openxmlformats.org/presentationml/2006/main">
   <p:cSld>
     <p:spTree>
@@ -14216,7 +14139,7 @@
 </p:sld>
 </file>
 
-<file path=ppt/slides/slide6.xml><?xml version="1.0" encoding="utf-8"?>
+<file path=ppt/slides/slide5.xml><?xml version="1.0" encoding="utf-8"?>
 <p:sld xmlns:a="http://schemas.openxmlformats.org/drawingml/2006/main" xmlns:r="http://schemas.openxmlformats.org/officeDocument/2006/relationships" xmlns:p="http://schemas.openxmlformats.org/presentationml/2006/main">
   <p:cSld>
     <p:spTree>
@@ -14335,6 +14258,115 @@
     <p:extLst>
       <p:ext uri="{BB962C8B-B14F-4D97-AF65-F5344CB8AC3E}">
         <p14:creationId xmlns:p14="http://schemas.microsoft.com/office/powerpoint/2010/main" val="3038222103"/>
+      </p:ext>
+    </p:extLst>
+  </p:cSld>
+  <p:clrMapOvr>
+    <a:masterClrMapping/>
+  </p:clrMapOvr>
+</p:sld>
+</file>
+
+<file path=ppt/slides/slide6.xml><?xml version="1.0" encoding="utf-8"?>
+<p:sld xmlns:a="http://schemas.openxmlformats.org/drawingml/2006/main" xmlns:r="http://schemas.openxmlformats.org/officeDocument/2006/relationships" xmlns:p="http://schemas.openxmlformats.org/presentationml/2006/main">
+  <p:cSld>
+    <p:spTree>
+      <p:nvGrpSpPr>
+        <p:cNvPr id="1" name=""/>
+        <p:cNvGrpSpPr/>
+        <p:nvPr/>
+      </p:nvGrpSpPr>
+      <p:grpSpPr>
+        <a:xfrm>
+          <a:off x="0" y="0"/>
+          <a:ext cx="0" cy="0"/>
+          <a:chOff x="0" y="0"/>
+          <a:chExt cx="0" cy="0"/>
+        </a:xfrm>
+      </p:grpSpPr>
+      <p:sp>
+        <p:nvSpPr>
+          <p:cNvPr id="2" name="Title 1">
+            <a:extLst>
+              <a:ext uri="{FF2B5EF4-FFF2-40B4-BE49-F238E27FC236}">
+                <a16:creationId xmlns:a16="http://schemas.microsoft.com/office/drawing/2014/main" id="{B98EC121-6412-41E3-9FAF-7FC75B58DB05}"/>
+              </a:ext>
+            </a:extLst>
+          </p:cNvPr>
+          <p:cNvSpPr>
+            <a:spLocks noGrp="1"/>
+          </p:cNvSpPr>
+          <p:nvPr>
+            <p:ph type="title"/>
+          </p:nvPr>
+        </p:nvSpPr>
+        <p:spPr/>
+        <p:txBody>
+          <a:bodyPr/>
+          <a:lstStyle/>
+          <a:p>
+            <a:r>
+              <a:rPr lang="en-US" dirty="0"/>
+              <a:t>“Some Algorithms” overview</a:t>
+            </a:r>
+          </a:p>
+        </p:txBody>
+      </p:sp>
+      <p:sp>
+        <p:nvSpPr>
+          <p:cNvPr id="3" name="Content Placeholder 2">
+            <a:extLst>
+              <a:ext uri="{FF2B5EF4-FFF2-40B4-BE49-F238E27FC236}">
+                <a16:creationId xmlns:a16="http://schemas.microsoft.com/office/drawing/2014/main" id="{5E59D970-62AF-4D9D-A41A-076D843D911E}"/>
+              </a:ext>
+            </a:extLst>
+          </p:cNvPr>
+          <p:cNvSpPr>
+            <a:spLocks noGrp="1"/>
+          </p:cNvSpPr>
+          <p:nvPr>
+            <p:ph idx="1"/>
+          </p:nvPr>
+        </p:nvSpPr>
+        <p:spPr/>
+        <p:txBody>
+          <a:bodyPr>
+            <a:normAutofit/>
+          </a:bodyPr>
+          <a:lstStyle/>
+          <a:p>
+            <a:r>
+              <a:rPr lang="en-US" dirty="0"/>
+              <a:t>It will be harder for some algorithms to detect patterns if data is skewed, pg. 49</a:t>
+            </a:r>
+          </a:p>
+          <a:p>
+            <a:r>
+              <a:rPr lang="en-US" dirty="0"/>
+              <a:t>Most algorithms cannot work with missing features, pg. 61</a:t>
+            </a:r>
+          </a:p>
+          <a:p>
+            <a:r>
+              <a:rPr lang="en-US" dirty="0"/>
+              <a:t>Most algorithms prefer to work with numbers, pg. 63</a:t>
+            </a:r>
+          </a:p>
+          <a:p>
+            <a:r>
+              <a:rPr lang="en-US" dirty="0"/>
+              <a:t>Most algorithms don’t perform well when the input numerical attributes have different scales, pg. 66</a:t>
+            </a:r>
+          </a:p>
+          <a:p>
+            <a:endParaRPr lang="en-US" dirty="0"/>
+          </a:p>
+        </p:txBody>
+      </p:sp>
+    </p:spTree>
+    <p:extLst>
+      <p:ext uri="{BB962C8B-B14F-4D97-AF65-F5344CB8AC3E}">
+        <p14:creationId xmlns:p14="http://schemas.microsoft.com/office/powerpoint/2010/main" val="558078344"/>
       </p:ext>
     </p:extLst>
   </p:cSld>

</xml_diff>